<commit_message>
update : generate ul master ppt template
</commit_message>
<xml_diff>
--- a/pyppt.pptx
+++ b/pyppt.pptx
@@ -264,7 +264,7 @@
           <a:p>
             <a:fld id="{B4590A01-A4B5-43C8-8A25-8438B2696CDC}" type="datetimeFigureOut">
               <a:rPr lang="en-ID" smtClean="0"/>
-              <a:t>02/01/2026</a:t>
+              <a:t>05/01/2026</a:t>
             </a:fld>
             <a:endParaRPr lang="en-ID"/>
           </a:p>
@@ -464,7 +464,7 @@
           <a:p>
             <a:fld id="{B4590A01-A4B5-43C8-8A25-8438B2696CDC}" type="datetimeFigureOut">
               <a:rPr lang="en-ID" smtClean="0"/>
-              <a:t>02/01/2026</a:t>
+              <a:t>05/01/2026</a:t>
             </a:fld>
             <a:endParaRPr lang="en-ID"/>
           </a:p>
@@ -674,7 +674,7 @@
           <a:p>
             <a:fld id="{B4590A01-A4B5-43C8-8A25-8438B2696CDC}" type="datetimeFigureOut">
               <a:rPr lang="en-ID" smtClean="0"/>
-              <a:t>02/01/2026</a:t>
+              <a:t>05/01/2026</a:t>
             </a:fld>
             <a:endParaRPr lang="en-ID"/>
           </a:p>
@@ -874,7 +874,7 @@
           <a:p>
             <a:fld id="{B4590A01-A4B5-43C8-8A25-8438B2696CDC}" type="datetimeFigureOut">
               <a:rPr lang="en-ID" smtClean="0"/>
-              <a:t>02/01/2026</a:t>
+              <a:t>05/01/2026</a:t>
             </a:fld>
             <a:endParaRPr lang="en-ID"/>
           </a:p>
@@ -1150,7 +1150,7 @@
           <a:p>
             <a:fld id="{B4590A01-A4B5-43C8-8A25-8438B2696CDC}" type="datetimeFigureOut">
               <a:rPr lang="en-ID" smtClean="0"/>
-              <a:t>02/01/2026</a:t>
+              <a:t>05/01/2026</a:t>
             </a:fld>
             <a:endParaRPr lang="en-ID"/>
           </a:p>
@@ -1418,7 +1418,7 @@
           <a:p>
             <a:fld id="{B4590A01-A4B5-43C8-8A25-8438B2696CDC}" type="datetimeFigureOut">
               <a:rPr lang="en-ID" smtClean="0"/>
-              <a:t>02/01/2026</a:t>
+              <a:t>05/01/2026</a:t>
             </a:fld>
             <a:endParaRPr lang="en-ID"/>
           </a:p>
@@ -1833,7 +1833,7 @@
           <a:p>
             <a:fld id="{B4590A01-A4B5-43C8-8A25-8438B2696CDC}" type="datetimeFigureOut">
               <a:rPr lang="en-ID" smtClean="0"/>
-              <a:t>02/01/2026</a:t>
+              <a:t>05/01/2026</a:t>
             </a:fld>
             <a:endParaRPr lang="en-ID"/>
           </a:p>
@@ -1975,7 +1975,7 @@
           <a:p>
             <a:fld id="{B4590A01-A4B5-43C8-8A25-8438B2696CDC}" type="datetimeFigureOut">
               <a:rPr lang="en-ID" smtClean="0"/>
-              <a:t>02/01/2026</a:t>
+              <a:t>05/01/2026</a:t>
             </a:fld>
             <a:endParaRPr lang="en-ID"/>
           </a:p>
@@ -2088,7 +2088,7 @@
           <a:p>
             <a:fld id="{B4590A01-A4B5-43C8-8A25-8438B2696CDC}" type="datetimeFigureOut">
               <a:rPr lang="en-ID" smtClean="0"/>
-              <a:t>02/01/2026</a:t>
+              <a:t>05/01/2026</a:t>
             </a:fld>
             <a:endParaRPr lang="en-ID"/>
           </a:p>
@@ -2401,7 +2401,7 @@
           <a:p>
             <a:fld id="{B4590A01-A4B5-43C8-8A25-8438B2696CDC}" type="datetimeFigureOut">
               <a:rPr lang="en-ID" smtClean="0"/>
-              <a:t>02/01/2026</a:t>
+              <a:t>05/01/2026</a:t>
             </a:fld>
             <a:endParaRPr lang="en-ID"/>
           </a:p>
@@ -2690,7 +2690,7 @@
           <a:p>
             <a:fld id="{B4590A01-A4B5-43C8-8A25-8438B2696CDC}" type="datetimeFigureOut">
               <a:rPr lang="en-ID" smtClean="0"/>
-              <a:t>02/01/2026</a:t>
+              <a:t>05/01/2026</a:t>
             </a:fld>
             <a:endParaRPr lang="en-ID"/>
           </a:p>
@@ -2933,7 +2933,7 @@
           <a:p>
             <a:fld id="{B4590A01-A4B5-43C8-8A25-8438B2696CDC}" type="datetimeFigureOut">
               <a:rPr lang="en-ID" smtClean="0"/>
-              <a:t>02/01/2026</a:t>
+              <a:t>05/01/2026</a:t>
             </a:fld>
             <a:endParaRPr lang="en-ID"/>
           </a:p>
@@ -3454,77 +3454,23 @@
             <p:ph type="title"/>
           </p:nvPr>
         </p:nvSpPr>
-        <p:spPr/>
+        <p:spPr>
+          <a:xfrm>
+            <a:off x="838200" y="365125"/>
+            <a:ext cx="10515600" cy="631571"/>
+          </a:xfrm>
+        </p:spPr>
         <p:txBody>
           <a:bodyPr>
-            <a:normAutofit fontScale="90000"/>
+            <a:normAutofit/>
           </a:bodyPr>
           <a:lstStyle/>
           <a:p>
             <a:r>
-              <a:rPr lang="en-US" b="1" dirty="0"/>
-              <a:t>Update </a:t>
-            </a:r>
-            <a:r>
-              <a:rPr lang="en-US" b="1" dirty="0" err="1"/>
-              <a:t>Kondisi</a:t>
-            </a:r>
-            <a:r>
-              <a:rPr lang="en-US" b="1" dirty="0"/>
-              <a:t> </a:t>
-            </a:r>
-            <a:r>
-              <a:rPr lang="en-US" b="1" dirty="0" err="1"/>
-              <a:t>Siklon</a:t>
-            </a:r>
-            <a:r>
-              <a:rPr lang="en-US" b="1" dirty="0"/>
-              <a:t> </a:t>
-            </a:r>
-            <a:r>
-              <a:rPr lang="en-US" b="1" dirty="0" err="1"/>
-              <a:t>Tropis</a:t>
-            </a:r>
-            <a:r>
-              <a:rPr lang="en-US" b="1" dirty="0"/>
-              <a:t> dan </a:t>
-            </a:r>
-            <a:r>
-              <a:rPr lang="en-US" b="1" dirty="0" err="1"/>
-              <a:t>Bibit</a:t>
-            </a:r>
-            <a:r>
-              <a:rPr lang="en-US" b="1" dirty="0"/>
-              <a:t> </a:t>
-            </a:r>
-            <a:r>
-              <a:rPr lang="en-US" b="1" dirty="0" err="1"/>
-              <a:t>Siklon</a:t>
-            </a:r>
-            <a:r>
-              <a:rPr lang="en-US" b="1" dirty="0"/>
-              <a:t> </a:t>
-            </a:r>
-            <a:r>
-              <a:rPr lang="en-US" b="1" dirty="0" err="1"/>
-              <a:t>Tropis</a:t>
-            </a:r>
-            <a:br>
-              <a:rPr lang="en-US" b="1" dirty="0"/>
-            </a:br>
-            <a:r>
-              <a:rPr lang="en-US" sz="2700" b="1" dirty="0"/>
-              <a:t>Selasa, 30 </a:t>
-            </a:r>
-            <a:r>
-              <a:rPr lang="en-US" sz="2700" b="1" dirty="0" err="1"/>
-              <a:t>Desember</a:t>
-            </a:r>
-            <a:r>
-              <a:rPr lang="en-US" sz="2700" b="1" dirty="0"/>
-              <a:t> 2025, 07.00 WIB</a:t>
-            </a:r>
-            <a:endParaRPr lang="en-ID" b="1" dirty="0"/>
+              <a:rPr lang="en-US" sz="3200" b="1" dirty="0" err="1"/>
+              <a:t>judul</a:t>
+            </a:r>
+            <a:endParaRPr lang="en-ID" sz="3200" b="1" dirty="0"/>
           </a:p>
         </p:txBody>
       </p:sp>
@@ -3556,9 +3502,12 @@
           </a:bodyPr>
           <a:lstStyle/>
           <a:p>
+            <a:pPr marL="0" indent="0">
+              <a:buNone/>
+            </a:pPr>
             <a:r>
               <a:rPr lang="en-US" sz="1400" dirty="0"/>
-              <a:t>Override slide 2 content</a:t>
+              <a:t>container1</a:t>
             </a:r>
             <a:endParaRPr lang="en-ID" sz="1400" dirty="0"/>
           </a:p>
@@ -3792,11 +3741,50 @@
             </a:lvl9pPr>
           </a:lstStyle>
           <a:p>
+            <a:pPr marL="0" indent="0">
+              <a:buNone/>
+            </a:pPr>
             <a:r>
               <a:rPr lang="en-US" sz="1400" dirty="0"/>
-              <a:t>Override slide 2 content</a:t>
+              <a:t>container2</a:t>
             </a:r>
             <a:endParaRPr lang="en-ID" sz="1400" dirty="0"/>
+          </a:p>
+        </p:txBody>
+      </p:sp>
+      <p:sp>
+        <p:nvSpPr>
+          <p:cNvPr id="5" name="TextBox 4">
+            <a:extLst>
+              <a:ext uri="{FF2B5EF4-FFF2-40B4-BE49-F238E27FC236}">
+                <a16:creationId xmlns:a16="http://schemas.microsoft.com/office/drawing/2014/main" id="{75BBF1A4-E509-9E90-56B1-A79D2BBF86F0}"/>
+              </a:ext>
+            </a:extLst>
+          </p:cNvPr>
+          <p:cNvSpPr txBox="1"/>
+          <p:nvPr/>
+        </p:nvSpPr>
+        <p:spPr>
+          <a:xfrm>
+            <a:off x="838200" y="996696"/>
+            <a:ext cx="885692" cy="369332"/>
+          </a:xfrm>
+          <a:prstGeom prst="rect">
+            <a:avLst/>
+          </a:prstGeom>
+          <a:noFill/>
+        </p:spPr>
+        <p:txBody>
+          <a:bodyPr wrap="none" rtlCol="0">
+            <a:spAutoFit/>
+          </a:bodyPr>
+          <a:lstStyle/>
+          <a:p>
+            <a:r>
+              <a:rPr lang="en-US" b="1" dirty="0" err="1"/>
+              <a:t>tanggal</a:t>
+            </a:r>
+            <a:endParaRPr lang="en-ID" dirty="0"/>
           </a:p>
         </p:txBody>
       </p:sp>

</xml_diff>